<commit_message>
fix powerpoint and somecode
</commit_message>
<xml_diff>
--- a/การทำนายสภาพอากาศด้วย Linear Regression.pptx
+++ b/การทำนายสภาพอากาศด้วย Linear Regression.pptx
@@ -5,10 +5,10 @@
     <p:sldMasterId id="2147483746" r:id="rId1"/>
   </p:sldMasterIdLst>
   <p:notesMasterIdLst>
-    <p:notesMasterId r:id="rId11"/>
+    <p:notesMasterId r:id="rId9"/>
   </p:notesMasterIdLst>
   <p:handoutMasterIdLst>
-    <p:handoutMasterId r:id="rId12"/>
+    <p:handoutMasterId r:id="rId10"/>
   </p:handoutMasterIdLst>
   <p:sldIdLst>
     <p:sldId id="257" r:id="rId2"/>
@@ -18,8 +18,6 @@
     <p:sldId id="262" r:id="rId6"/>
     <p:sldId id="263" r:id="rId7"/>
     <p:sldId id="264" r:id="rId8"/>
-    <p:sldId id="265" r:id="rId9"/>
-    <p:sldId id="266" r:id="rId10"/>
   </p:sldIdLst>
   <p:sldSz cx="12192000" cy="6858000"/>
   <p:notesSz cx="6858000" cy="9144000"/>
@@ -4848,35 +4846,6 @@
           </a:p>
         </p:txBody>
       </p:sp>
-      <p:pic>
-        <p:nvPicPr>
-          <p:cNvPr id="11" name="Content Placeholder 10">
-            <a:extLst>
-              <a:ext uri="{FF2B5EF4-FFF2-40B4-BE49-F238E27FC236}">
-                <a16:creationId xmlns:a16="http://schemas.microsoft.com/office/drawing/2014/main" id="{63DA5E6D-034E-BA4B-9375-179B1F8FED69}"/>
-              </a:ext>
-            </a:extLst>
-          </p:cNvPr>
-          <p:cNvPicPr>
-            <a:picLocks noGrp="1" noChangeAspect="1"/>
-          </p:cNvPicPr>
-          <p:nvPr>
-            <p:ph idx="1"/>
-          </p:nvPr>
-        </p:nvPicPr>
-        <p:blipFill>
-          <a:blip r:embed="rId2"/>
-          <a:stretch>
-            <a:fillRect/>
-          </a:stretch>
-        </p:blipFill>
-        <p:spPr>
-          <a:xfrm>
-            <a:off x="1998616" y="2234129"/>
-            <a:ext cx="7874224" cy="2193921"/>
-          </a:xfrm>
-        </p:spPr>
-      </p:pic>
       <p:sp>
         <p:nvSpPr>
           <p:cNvPr id="13" name="Rectangle 12">
@@ -4891,8 +4860,8 @@
         </p:nvSpPr>
         <p:spPr>
           <a:xfrm>
-            <a:off x="1921108" y="4621007"/>
-            <a:ext cx="6473709" cy="1187669"/>
+            <a:off x="1921109" y="4621007"/>
+            <a:ext cx="5514862" cy="1187669"/>
           </a:xfrm>
           <a:prstGeom prst="rect">
             <a:avLst/>
@@ -4932,7 +4901,7 @@
             <a:pPr algn="ctr"/>
             <a:r>
               <a:rPr lang="en-US" dirty="0"/>
-              <a:t>80%</a:t>
+              <a:t>70%</a:t>
             </a:r>
             <a:endParaRPr lang="th-TH" dirty="0"/>
           </a:p>
@@ -4952,8 +4921,8 @@
         </p:nvSpPr>
         <p:spPr>
           <a:xfrm>
-            <a:off x="8394817" y="4621006"/>
-            <a:ext cx="1478023" cy="1187669"/>
+            <a:off x="7435971" y="4621006"/>
+            <a:ext cx="2436869" cy="1187669"/>
           </a:xfrm>
           <a:prstGeom prst="rect">
             <a:avLst/>
@@ -4993,7 +4962,7 @@
             <a:pPr algn="ctr"/>
             <a:r>
               <a:rPr lang="en-US" dirty="0"/>
-              <a:t>20%</a:t>
+              <a:t>30%</a:t>
             </a:r>
             <a:endParaRPr lang="th-TH" dirty="0"/>
           </a:p>
@@ -5017,7 +4986,7 @@
         </p:nvSpPr>
         <p:spPr>
           <a:xfrm>
-            <a:off x="4821631" y="5943091"/>
+            <a:off x="4342209" y="5949305"/>
             <a:ext cx="672662" cy="369332"/>
           </a:xfrm>
           <a:prstGeom prst="rect">
@@ -5053,7 +5022,7 @@
         </p:nvSpPr>
         <p:spPr>
           <a:xfrm>
-            <a:off x="8797497" y="5949305"/>
+            <a:off x="8318074" y="5949305"/>
             <a:ext cx="672662" cy="369332"/>
           </a:xfrm>
           <a:prstGeom prst="rect">
@@ -5075,6 +5044,36 @@
           </a:p>
         </p:txBody>
       </p:sp>
+      <p:pic>
+        <p:nvPicPr>
+          <p:cNvPr id="5" name="Picture 4">
+            <a:extLst>
+              <a:ext uri="{FF2B5EF4-FFF2-40B4-BE49-F238E27FC236}">
+                <a16:creationId xmlns:a16="http://schemas.microsoft.com/office/drawing/2014/main" id="{8830B5FF-D2FB-F905-E8D6-F281EBDDD9B3}"/>
+              </a:ext>
+            </a:extLst>
+          </p:cNvPr>
+          <p:cNvPicPr>
+            <a:picLocks noChangeAspect="1"/>
+          </p:cNvPicPr>
+          <p:nvPr/>
+        </p:nvPicPr>
+        <p:blipFill>
+          <a:blip r:embed="rId2"/>
+          <a:stretch>
+            <a:fillRect/>
+          </a:stretch>
+        </p:blipFill>
+        <p:spPr>
+          <a:xfrm>
+            <a:off x="2058956" y="2191470"/>
+            <a:ext cx="7813884" cy="2115823"/>
+          </a:xfrm>
+          <a:prstGeom prst="rect">
+            <a:avLst/>
+          </a:prstGeom>
+        </p:spPr>
+      </p:pic>
     </p:spTree>
     <p:extLst>
       <p:ext uri="{BB962C8B-B14F-4D97-AF65-F5344CB8AC3E}">
@@ -5264,10 +5263,10 @@
       </p:pic>
       <p:pic>
         <p:nvPicPr>
-          <p:cNvPr id="8" name="Picture 7">
+          <p:cNvPr id="4" name="Picture 3">
             <a:extLst>
               <a:ext uri="{FF2B5EF4-FFF2-40B4-BE49-F238E27FC236}">
-                <a16:creationId xmlns:a16="http://schemas.microsoft.com/office/drawing/2014/main" id="{09792CEC-4C7E-22AF-8617-ECC1E9B5CBD4}"/>
+                <a16:creationId xmlns:a16="http://schemas.microsoft.com/office/drawing/2014/main" id="{269431A4-8037-569C-EFB8-095BCA9F9EC6}"/>
               </a:ext>
             </a:extLst>
           </p:cNvPr>
@@ -5276,16 +5275,15 @@
           </p:cNvPicPr>
           <p:nvPr/>
         </p:nvPicPr>
-        <p:blipFill>
+        <p:blipFill rotWithShape="1">
           <a:blip r:embed="rId3"/>
-          <a:stretch>
-            <a:fillRect/>
-          </a:stretch>
+          <a:srcRect t="24823"/>
+          <a:stretch/>
         </p:blipFill>
         <p:spPr>
           <a:xfrm>
-            <a:off x="1533881" y="5120640"/>
-            <a:ext cx="9124238" cy="608284"/>
+            <a:off x="2511982" y="5184475"/>
+            <a:ext cx="7168035" cy="428462"/>
           </a:xfrm>
           <a:prstGeom prst="rect">
             <a:avLst/>
@@ -5379,208 +5377,108 @@
         </p:blipFill>
         <p:spPr>
           <a:xfrm>
-            <a:off x="4878955" y="844588"/>
-            <a:ext cx="7582557" cy="5486875"/>
+            <a:off x="4887582" y="414762"/>
+            <a:ext cx="6948666" cy="5028180"/>
           </a:xfrm>
           <a:prstGeom prst="rect">
             <a:avLst/>
           </a:prstGeom>
         </p:spPr>
       </p:pic>
+      <p:sp>
+        <p:nvSpPr>
+          <p:cNvPr id="2" name="TextBox 1">
+            <a:extLst>
+              <a:ext uri="{FF2B5EF4-FFF2-40B4-BE49-F238E27FC236}">
+                <a16:creationId xmlns:a16="http://schemas.microsoft.com/office/drawing/2014/main" id="{7F00A9D4-9B8E-1FE5-DB72-C3343728F1F4}"/>
+              </a:ext>
+            </a:extLst>
+          </p:cNvPr>
+          <p:cNvSpPr txBox="1"/>
+          <p:nvPr/>
+        </p:nvSpPr>
+        <p:spPr>
+          <a:xfrm>
+            <a:off x="6682596" y="5442942"/>
+            <a:ext cx="1184695" cy="923330"/>
+          </a:xfrm>
+          <a:prstGeom prst="rect">
+            <a:avLst/>
+          </a:prstGeom>
+          <a:noFill/>
+        </p:spPr>
+        <p:txBody>
+          <a:bodyPr wrap="square" rtlCol="0">
+            <a:spAutoFit/>
+          </a:bodyPr>
+          <a:lstStyle/>
+          <a:p>
+            <a:r>
+              <a:rPr lang="en-US" dirty="0"/>
+              <a:t>1 drizzle</a:t>
+            </a:r>
+          </a:p>
+          <a:p>
+            <a:r>
+              <a:rPr lang="en-US" dirty="0"/>
+              <a:t>2 rain</a:t>
+            </a:r>
+          </a:p>
+          <a:p>
+            <a:r>
+              <a:rPr lang="en-US" dirty="0"/>
+              <a:t>3 sun</a:t>
+            </a:r>
+            <a:endParaRPr lang="th-TH" dirty="0"/>
+          </a:p>
+        </p:txBody>
+      </p:sp>
+      <p:sp>
+        <p:nvSpPr>
+          <p:cNvPr id="4" name="TextBox 3">
+            <a:extLst>
+              <a:ext uri="{FF2B5EF4-FFF2-40B4-BE49-F238E27FC236}">
+                <a16:creationId xmlns:a16="http://schemas.microsoft.com/office/drawing/2014/main" id="{9474918E-B174-A77F-7F51-FEAB2754B815}"/>
+              </a:ext>
+            </a:extLst>
+          </p:cNvPr>
+          <p:cNvSpPr txBox="1"/>
+          <p:nvPr/>
+        </p:nvSpPr>
+        <p:spPr>
+          <a:xfrm>
+            <a:off x="8212017" y="5442942"/>
+            <a:ext cx="1326081" cy="646331"/>
+          </a:xfrm>
+          <a:prstGeom prst="rect">
+            <a:avLst/>
+          </a:prstGeom>
+          <a:noFill/>
+        </p:spPr>
+        <p:txBody>
+          <a:bodyPr wrap="square">
+            <a:spAutoFit/>
+          </a:bodyPr>
+          <a:lstStyle/>
+          <a:p>
+            <a:r>
+              <a:rPr lang="en-US" dirty="0"/>
+              <a:t>4 snow</a:t>
+            </a:r>
+          </a:p>
+          <a:p>
+            <a:r>
+              <a:rPr lang="en-US" dirty="0"/>
+              <a:t>5 fog </a:t>
+            </a:r>
+            <a:endParaRPr lang="th-TH" dirty="0"/>
+          </a:p>
+        </p:txBody>
+      </p:sp>
     </p:spTree>
     <p:extLst>
       <p:ext uri="{BB962C8B-B14F-4D97-AF65-F5344CB8AC3E}">
         <p14:creationId xmlns:p14="http://schemas.microsoft.com/office/powerpoint/2010/main" val="4221047683"/>
-      </p:ext>
-    </p:extLst>
-  </p:cSld>
-  <p:clrMapOvr>
-    <a:masterClrMapping/>
-  </p:clrMapOvr>
-</p:sld>
-</file>
-
-<file path=ppt/slides/slide8.xml><?xml version="1.0" encoding="utf-8"?>
-<p:sld xmlns:a="http://schemas.openxmlformats.org/drawingml/2006/main" xmlns:r="http://schemas.openxmlformats.org/officeDocument/2006/relationships" xmlns:p="http://schemas.openxmlformats.org/presentationml/2006/main">
-  <p:cSld>
-    <p:spTree>
-      <p:nvGrpSpPr>
-        <p:cNvPr id="1" name=""/>
-        <p:cNvGrpSpPr/>
-        <p:nvPr/>
-      </p:nvGrpSpPr>
-      <p:grpSpPr>
-        <a:xfrm>
-          <a:off x="0" y="0"/>
-          <a:ext cx="0" cy="0"/>
-          <a:chOff x="0" y="0"/>
-          <a:chExt cx="0" cy="0"/>
-        </a:xfrm>
-      </p:grpSpPr>
-      <p:sp>
-        <p:nvSpPr>
-          <p:cNvPr id="9" name="Title 1">
-            <a:extLst>
-              <a:ext uri="{FF2B5EF4-FFF2-40B4-BE49-F238E27FC236}">
-                <a16:creationId xmlns:a16="http://schemas.microsoft.com/office/drawing/2014/main" id="{D2961D40-A93C-726E-9656-F8FDBF4BAE76}"/>
-              </a:ext>
-            </a:extLst>
-          </p:cNvPr>
-          <p:cNvSpPr>
-            <a:spLocks noGrp="1"/>
-          </p:cNvSpPr>
-          <p:nvPr>
-            <p:ph type="title"/>
-          </p:nvPr>
-        </p:nvSpPr>
-        <p:spPr>
-          <a:xfrm>
-            <a:off x="133181" y="1303283"/>
-            <a:ext cx="4538134" cy="2932909"/>
-          </a:xfrm>
-        </p:spPr>
-        <p:txBody>
-          <a:bodyPr>
-            <a:normAutofit/>
-          </a:bodyPr>
-          <a:lstStyle/>
-          <a:p>
-            <a:r>
-              <a:rPr lang="en-US" sz="6600" dirty="0"/>
-              <a:t>Result</a:t>
-            </a:r>
-          </a:p>
-        </p:txBody>
-      </p:sp>
-      <p:pic>
-        <p:nvPicPr>
-          <p:cNvPr id="3" name="Picture 2">
-            <a:extLst>
-              <a:ext uri="{FF2B5EF4-FFF2-40B4-BE49-F238E27FC236}">
-                <a16:creationId xmlns:a16="http://schemas.microsoft.com/office/drawing/2014/main" id="{BF6ED17D-11D7-C429-897B-4B40827C4624}"/>
-              </a:ext>
-            </a:extLst>
-          </p:cNvPr>
-          <p:cNvPicPr>
-            <a:picLocks noChangeAspect="1"/>
-          </p:cNvPicPr>
-          <p:nvPr/>
-        </p:nvPicPr>
-        <p:blipFill>
-          <a:blip r:embed="rId2"/>
-          <a:stretch>
-            <a:fillRect/>
-          </a:stretch>
-        </p:blipFill>
-        <p:spPr>
-          <a:xfrm>
-            <a:off x="4780653" y="695386"/>
-            <a:ext cx="7354075" cy="5511872"/>
-          </a:xfrm>
-          <a:prstGeom prst="rect">
-            <a:avLst/>
-          </a:prstGeom>
-        </p:spPr>
-      </p:pic>
-    </p:spTree>
-    <p:extLst>
-      <p:ext uri="{BB962C8B-B14F-4D97-AF65-F5344CB8AC3E}">
-        <p14:creationId xmlns:p14="http://schemas.microsoft.com/office/powerpoint/2010/main" val="491997948"/>
-      </p:ext>
-    </p:extLst>
-  </p:cSld>
-  <p:clrMapOvr>
-    <a:masterClrMapping/>
-  </p:clrMapOvr>
-</p:sld>
-</file>
-
-<file path=ppt/slides/slide9.xml><?xml version="1.0" encoding="utf-8"?>
-<p:sld xmlns:a="http://schemas.openxmlformats.org/drawingml/2006/main" xmlns:r="http://schemas.openxmlformats.org/officeDocument/2006/relationships" xmlns:p="http://schemas.openxmlformats.org/presentationml/2006/main">
-  <p:cSld>
-    <p:spTree>
-      <p:nvGrpSpPr>
-        <p:cNvPr id="1" name=""/>
-        <p:cNvGrpSpPr/>
-        <p:nvPr/>
-      </p:nvGrpSpPr>
-      <p:grpSpPr>
-        <a:xfrm>
-          <a:off x="0" y="0"/>
-          <a:ext cx="0" cy="0"/>
-          <a:chOff x="0" y="0"/>
-          <a:chExt cx="0" cy="0"/>
-        </a:xfrm>
-      </p:grpSpPr>
-      <p:sp>
-        <p:nvSpPr>
-          <p:cNvPr id="9" name="Title 1">
-            <a:extLst>
-              <a:ext uri="{FF2B5EF4-FFF2-40B4-BE49-F238E27FC236}">
-                <a16:creationId xmlns:a16="http://schemas.microsoft.com/office/drawing/2014/main" id="{D2961D40-A93C-726E-9656-F8FDBF4BAE76}"/>
-              </a:ext>
-            </a:extLst>
-          </p:cNvPr>
-          <p:cNvSpPr>
-            <a:spLocks noGrp="1"/>
-          </p:cNvSpPr>
-          <p:nvPr>
-            <p:ph type="title"/>
-          </p:nvPr>
-        </p:nvSpPr>
-        <p:spPr>
-          <a:xfrm>
-            <a:off x="133181" y="1303283"/>
-            <a:ext cx="4538134" cy="2932909"/>
-          </a:xfrm>
-        </p:spPr>
-        <p:txBody>
-          <a:bodyPr>
-            <a:normAutofit/>
-          </a:bodyPr>
-          <a:lstStyle/>
-          <a:p>
-            <a:r>
-              <a:rPr lang="en-US" sz="6600" dirty="0"/>
-              <a:t>Result</a:t>
-            </a:r>
-          </a:p>
-        </p:txBody>
-      </p:sp>
-      <p:pic>
-        <p:nvPicPr>
-          <p:cNvPr id="3" name="Picture 2">
-            <a:extLst>
-              <a:ext uri="{FF2B5EF4-FFF2-40B4-BE49-F238E27FC236}">
-                <a16:creationId xmlns:a16="http://schemas.microsoft.com/office/drawing/2014/main" id="{9E1EDE09-DB61-B8C2-04FE-B6745367A0D2}"/>
-              </a:ext>
-            </a:extLst>
-          </p:cNvPr>
-          <p:cNvPicPr>
-            <a:picLocks noChangeAspect="1"/>
-          </p:cNvPicPr>
-          <p:nvPr/>
-        </p:nvPicPr>
-        <p:blipFill>
-          <a:blip r:embed="rId2"/>
-          <a:stretch>
-            <a:fillRect/>
-          </a:stretch>
-        </p:blipFill>
-        <p:spPr>
-          <a:xfrm>
-            <a:off x="4924712" y="706500"/>
-            <a:ext cx="7267288" cy="5444999"/>
-          </a:xfrm>
-          <a:prstGeom prst="rect">
-            <a:avLst/>
-          </a:prstGeom>
-        </p:spPr>
-      </p:pic>
-    </p:spTree>
-    <p:extLst>
-      <p:ext uri="{BB962C8B-B14F-4D97-AF65-F5344CB8AC3E}">
-        <p14:creationId xmlns:p14="http://schemas.microsoft.com/office/powerpoint/2010/main" val="1688648893"/>
       </p:ext>
     </p:extLst>
   </p:cSld>

</xml_diff>